<commit_message>
Refactor .gitignore to remove *.pptx files, introduced Koi loss function, trained for multiple cases and parameters.
</commit_message>
<xml_diff>
--- a/status.pptx
+++ b/status.pptx
@@ -12,6 +12,9 @@
     <p:sldId id="260" r:id="rId6"/>
     <p:sldId id="261" r:id="rId7"/>
     <p:sldId id="262" r:id="rId8"/>
+    <p:sldId id="263" r:id="rId9"/>
+    <p:sldId id="264" r:id="rId10"/>
+    <p:sldId id="265" r:id="rId11"/>
   </p:sldIdLst>
   <p:sldSz cx="12192000" cy="6858000"/>
   <p:notesSz cx="6858000" cy="9144000"/>
@@ -132,7 +135,7 @@
 <file path=ppt/revisionInfo.xml><?xml version="1.0" encoding="utf-8"?>
 <p1510:revInfo xmlns:a="http://schemas.openxmlformats.org/drawingml/2006/main" xmlns:r="http://schemas.openxmlformats.org/officeDocument/2006/relationships" xmlns:p1510="http://schemas.microsoft.com/office/powerpoint/2015/10/main">
   <p1510:revLst>
-    <p1510:client id="{312E8114-CD7C-D240-A505-F7AB7A9A1CEE}" v="7" dt="2024-10-16T17:40:08.369"/>
+    <p1510:client id="{312E8114-CD7C-D240-A505-F7AB7A9A1CEE}" v="24" dt="2024-10-21T22:39:24.026"/>
   </p1510:revLst>
 </p1510:revInfo>
 </file>
@@ -141,8 +144,8 @@
 <pc:chgInfo xmlns:a="http://schemas.openxmlformats.org/drawingml/2006/main" xmlns:r="http://schemas.openxmlformats.org/officeDocument/2006/relationships" xmlns:ac="http://schemas.microsoft.com/office/drawing/2013/main/command" xmlns:pc="http://schemas.microsoft.com/office/powerpoint/2013/main/command">
   <pc:docChgLst>
     <pc:chgData name="Baki, Harish" userId="7bd82cdd-4639-443b-92f4-81f263a001e1" providerId="ADAL" clId="{312E8114-CD7C-D240-A505-F7AB7A9A1CEE}"/>
-    <pc:docChg chg="addSld modSld">
-      <pc:chgData name="Baki, Harish" userId="7bd82cdd-4639-443b-92f4-81f263a001e1" providerId="ADAL" clId="{312E8114-CD7C-D240-A505-F7AB7A9A1CEE}" dt="2024-10-16T17:40:39.160" v="114" actId="14826"/>
+    <pc:docChg chg="undo redo custSel addSld modSld">
+      <pc:chgData name="Baki, Harish" userId="7bd82cdd-4639-443b-92f4-81f263a001e1" providerId="ADAL" clId="{312E8114-CD7C-D240-A505-F7AB7A9A1CEE}" dt="2024-10-21T22:39:27.805" v="493" actId="20577"/>
       <pc:docMkLst>
         <pc:docMk/>
       </pc:docMkLst>
@@ -333,6 +336,243 @@
           </ac:picMkLst>
         </pc:picChg>
       </pc:sldChg>
+      <pc:sldChg chg="addSp delSp modSp add mod">
+        <pc:chgData name="Baki, Harish" userId="7bd82cdd-4639-443b-92f4-81f263a001e1" providerId="ADAL" clId="{312E8114-CD7C-D240-A505-F7AB7A9A1CEE}" dt="2024-10-21T20:50:33.105" v="312" actId="20577"/>
+        <pc:sldMkLst>
+          <pc:docMk/>
+          <pc:sldMk cId="2134051098" sldId="263"/>
+        </pc:sldMkLst>
+        <pc:spChg chg="mod">
+          <ac:chgData name="Baki, Harish" userId="7bd82cdd-4639-443b-92f4-81f263a001e1" providerId="ADAL" clId="{312E8114-CD7C-D240-A505-F7AB7A9A1CEE}" dt="2024-10-21T20:49:43.355" v="226" actId="1076"/>
+          <ac:spMkLst>
+            <pc:docMk/>
+            <pc:sldMk cId="2134051098" sldId="263"/>
+            <ac:spMk id="7" creationId="{277F5FD2-23F2-A39A-710B-5CE3866903DF}"/>
+          </ac:spMkLst>
+        </pc:spChg>
+        <pc:spChg chg="add mod">
+          <ac:chgData name="Baki, Harish" userId="7bd82cdd-4639-443b-92f4-81f263a001e1" providerId="ADAL" clId="{312E8114-CD7C-D240-A505-F7AB7A9A1CEE}" dt="2024-10-21T20:50:33.105" v="312" actId="20577"/>
+          <ac:spMkLst>
+            <pc:docMk/>
+            <pc:sldMk cId="2134051098" sldId="263"/>
+            <ac:spMk id="14" creationId="{881BBF53-B621-E286-FCC9-876FC40B6781}"/>
+          </ac:spMkLst>
+        </pc:spChg>
+        <pc:picChg chg="add mod modCrop">
+          <ac:chgData name="Baki, Harish" userId="7bd82cdd-4639-443b-92f4-81f263a001e1" providerId="ADAL" clId="{312E8114-CD7C-D240-A505-F7AB7A9A1CEE}" dt="2024-10-21T20:48:56.666" v="169" actId="1076"/>
+          <ac:picMkLst>
+            <pc:docMk/>
+            <pc:sldMk cId="2134051098" sldId="263"/>
+            <ac:picMk id="3" creationId="{61385268-7167-1864-A332-F30ECB5E262E}"/>
+          </ac:picMkLst>
+        </pc:picChg>
+        <pc:picChg chg="add mod modCrop">
+          <ac:chgData name="Baki, Harish" userId="7bd82cdd-4639-443b-92f4-81f263a001e1" providerId="ADAL" clId="{312E8114-CD7C-D240-A505-F7AB7A9A1CEE}" dt="2024-10-21T20:45:45.385" v="136" actId="1076"/>
+          <ac:picMkLst>
+            <pc:docMk/>
+            <pc:sldMk cId="2134051098" sldId="263"/>
+            <ac:picMk id="4" creationId="{171FDEBB-F747-865F-08E4-7E031784077E}"/>
+          </ac:picMkLst>
+        </pc:picChg>
+        <pc:picChg chg="del">
+          <ac:chgData name="Baki, Harish" userId="7bd82cdd-4639-443b-92f4-81f263a001e1" providerId="ADAL" clId="{312E8114-CD7C-D240-A505-F7AB7A9A1CEE}" dt="2024-10-21T20:42:20.992" v="116" actId="478"/>
+          <ac:picMkLst>
+            <pc:docMk/>
+            <pc:sldMk cId="2134051098" sldId="263"/>
+            <ac:picMk id="5" creationId="{4F45E814-EE97-4A2C-9DCB-2CE7F020C77F}"/>
+          </ac:picMkLst>
+        </pc:picChg>
+        <pc:picChg chg="del">
+          <ac:chgData name="Baki, Harish" userId="7bd82cdd-4639-443b-92f4-81f263a001e1" providerId="ADAL" clId="{312E8114-CD7C-D240-A505-F7AB7A9A1CEE}" dt="2024-10-21T20:42:24.585" v="120" actId="478"/>
+          <ac:picMkLst>
+            <pc:docMk/>
+            <pc:sldMk cId="2134051098" sldId="263"/>
+            <ac:picMk id="8" creationId="{50406B14-A290-2852-0B41-861A3E166119}"/>
+          </ac:picMkLst>
+        </pc:picChg>
+        <pc:picChg chg="add mod modCrop">
+          <ac:chgData name="Baki, Harish" userId="7bd82cdd-4639-443b-92f4-81f263a001e1" providerId="ADAL" clId="{312E8114-CD7C-D240-A505-F7AB7A9A1CEE}" dt="2024-10-21T20:48:53.803" v="168" actId="1076"/>
+          <ac:picMkLst>
+            <pc:docMk/>
+            <pc:sldMk cId="2134051098" sldId="263"/>
+            <ac:picMk id="13" creationId="{EC437136-E614-B210-9CED-7D3AD0E33407}"/>
+          </ac:picMkLst>
+        </pc:picChg>
+      </pc:sldChg>
+      <pc:sldChg chg="addSp delSp modSp add mod">
+        <pc:chgData name="Baki, Harish" userId="7bd82cdd-4639-443b-92f4-81f263a001e1" providerId="ADAL" clId="{312E8114-CD7C-D240-A505-F7AB7A9A1CEE}" dt="2024-10-21T22:39:27.805" v="493" actId="20577"/>
+        <pc:sldMkLst>
+          <pc:docMk/>
+          <pc:sldMk cId="3623330729" sldId="264"/>
+        </pc:sldMkLst>
+        <pc:spChg chg="add mod">
+          <ac:chgData name="Baki, Harish" userId="7bd82cdd-4639-443b-92f4-81f263a001e1" providerId="ADAL" clId="{312E8114-CD7C-D240-A505-F7AB7A9A1CEE}" dt="2024-10-21T20:55:16.485" v="338" actId="20577"/>
+          <ac:spMkLst>
+            <pc:docMk/>
+            <pc:sldMk cId="3623330729" sldId="264"/>
+            <ac:spMk id="6" creationId="{46038F00-4C0D-B6F2-45A7-782A3C99E0C3}"/>
+          </ac:spMkLst>
+        </pc:spChg>
+        <pc:spChg chg="del">
+          <ac:chgData name="Baki, Harish" userId="7bd82cdd-4639-443b-92f4-81f263a001e1" providerId="ADAL" clId="{312E8114-CD7C-D240-A505-F7AB7A9A1CEE}" dt="2024-10-21T20:54:13.570" v="317" actId="478"/>
+          <ac:spMkLst>
+            <pc:docMk/>
+            <pc:sldMk cId="3623330729" sldId="264"/>
+            <ac:spMk id="7" creationId="{2CFA77D6-D9A1-199C-6787-85D53ED3D973}"/>
+          </ac:spMkLst>
+        </pc:spChg>
+        <pc:spChg chg="add mod">
+          <ac:chgData name="Baki, Harish" userId="7bd82cdd-4639-443b-92f4-81f263a001e1" providerId="ADAL" clId="{312E8114-CD7C-D240-A505-F7AB7A9A1CEE}" dt="2024-10-21T20:55:20.614" v="350" actId="20577"/>
+          <ac:spMkLst>
+            <pc:docMk/>
+            <pc:sldMk cId="3623330729" sldId="264"/>
+            <ac:spMk id="8" creationId="{98A14C1E-2A8B-3F76-54C8-264F3A351EB2}"/>
+          </ac:spMkLst>
+        </pc:spChg>
+        <pc:spChg chg="del">
+          <ac:chgData name="Baki, Harish" userId="7bd82cdd-4639-443b-92f4-81f263a001e1" providerId="ADAL" clId="{312E8114-CD7C-D240-A505-F7AB7A9A1CEE}" dt="2024-10-21T20:54:11.868" v="316" actId="478"/>
+          <ac:spMkLst>
+            <pc:docMk/>
+            <pc:sldMk cId="3623330729" sldId="264"/>
+            <ac:spMk id="9" creationId="{1E5E23A9-318C-E6CD-9B5C-7A1C8BF57C75}"/>
+          </ac:spMkLst>
+        </pc:spChg>
+        <pc:spChg chg="add del">
+          <ac:chgData name="Baki, Harish" userId="7bd82cdd-4639-443b-92f4-81f263a001e1" providerId="ADAL" clId="{312E8114-CD7C-D240-A505-F7AB7A9A1CEE}" dt="2024-10-21T21:57:48.552" v="477" actId="478"/>
+          <ac:spMkLst>
+            <pc:docMk/>
+            <pc:sldMk cId="3623330729" sldId="264"/>
+            <ac:spMk id="12" creationId="{6CEEDCE5-1989-21F0-2EDF-A107FEF0CA86}"/>
+          </ac:spMkLst>
+        </pc:spChg>
+        <pc:spChg chg="del">
+          <ac:chgData name="Baki, Harish" userId="7bd82cdd-4639-443b-92f4-81f263a001e1" providerId="ADAL" clId="{312E8114-CD7C-D240-A505-F7AB7A9A1CEE}" dt="2024-10-21T20:54:13.570" v="317" actId="478"/>
+          <ac:spMkLst>
+            <pc:docMk/>
+            <pc:sldMk cId="3623330729" sldId="264"/>
+            <ac:spMk id="14" creationId="{C94C330D-543D-43E1-F295-7F1E6FDFCB28}"/>
+          </ac:spMkLst>
+        </pc:spChg>
+        <pc:spChg chg="add mod">
+          <ac:chgData name="Baki, Harish" userId="7bd82cdd-4639-443b-92f4-81f263a001e1" providerId="ADAL" clId="{312E8114-CD7C-D240-A505-F7AB7A9A1CEE}" dt="2024-10-21T22:39:27.805" v="493" actId="20577"/>
+          <ac:spMkLst>
+            <pc:docMk/>
+            <pc:sldMk cId="3623330729" sldId="264"/>
+            <ac:spMk id="15" creationId="{FDBE524F-359B-B843-C114-1383B6218903}"/>
+          </ac:spMkLst>
+        </pc:spChg>
+        <pc:picChg chg="del">
+          <ac:chgData name="Baki, Harish" userId="7bd82cdd-4639-443b-92f4-81f263a001e1" providerId="ADAL" clId="{312E8114-CD7C-D240-A505-F7AB7A9A1CEE}" dt="2024-10-21T20:54:08.766" v="314" actId="478"/>
+          <ac:picMkLst>
+            <pc:docMk/>
+            <pc:sldMk cId="3623330729" sldId="264"/>
+            <ac:picMk id="3" creationId="{1D200AF5-AFE8-D6EE-DB9C-9EC7DCEED56C}"/>
+          </ac:picMkLst>
+        </pc:picChg>
+        <pc:picChg chg="add mod">
+          <ac:chgData name="Baki, Harish" userId="7bd82cdd-4639-443b-92f4-81f263a001e1" providerId="ADAL" clId="{312E8114-CD7C-D240-A505-F7AB7A9A1CEE}" dt="2024-10-21T20:54:43.736" v="324" actId="14826"/>
+          <ac:picMkLst>
+            <pc:docMk/>
+            <pc:sldMk cId="3623330729" sldId="264"/>
+            <ac:picMk id="4" creationId="{DAE8BFC2-95E6-59D6-327C-D8691A7F7F46}"/>
+          </ac:picMkLst>
+        </pc:picChg>
+        <pc:picChg chg="add mod">
+          <ac:chgData name="Baki, Harish" userId="7bd82cdd-4639-443b-92f4-81f263a001e1" providerId="ADAL" clId="{312E8114-CD7C-D240-A505-F7AB7A9A1CEE}" dt="2024-10-21T20:55:11.445" v="326" actId="14826"/>
+          <ac:picMkLst>
+            <pc:docMk/>
+            <pc:sldMk cId="3623330729" sldId="264"/>
+            <ac:picMk id="5" creationId="{3ED59EEF-F75A-CA94-A874-E2802F0BD102}"/>
+          </ac:picMkLst>
+        </pc:picChg>
+        <pc:picChg chg="del">
+          <ac:chgData name="Baki, Harish" userId="7bd82cdd-4639-443b-92f4-81f263a001e1" providerId="ADAL" clId="{312E8114-CD7C-D240-A505-F7AB7A9A1CEE}" dt="2024-10-21T20:54:09.751" v="315" actId="478"/>
+          <ac:picMkLst>
+            <pc:docMk/>
+            <pc:sldMk cId="3623330729" sldId="264"/>
+            <ac:picMk id="13" creationId="{082DD6D9-B386-0DBD-64AF-40CE434638D6}"/>
+          </ac:picMkLst>
+        </pc:picChg>
+      </pc:sldChg>
+      <pc:sldChg chg="addSp delSp modSp add mod">
+        <pc:chgData name="Baki, Harish" userId="7bd82cdd-4639-443b-92f4-81f263a001e1" providerId="ADAL" clId="{312E8114-CD7C-D240-A505-F7AB7A9A1CEE}" dt="2024-10-21T21:01:46.367" v="476" actId="20577"/>
+        <pc:sldMkLst>
+          <pc:docMk/>
+          <pc:sldMk cId="417120182" sldId="265"/>
+        </pc:sldMkLst>
+        <pc:spChg chg="del">
+          <ac:chgData name="Baki, Harish" userId="7bd82cdd-4639-443b-92f4-81f263a001e1" providerId="ADAL" clId="{312E8114-CD7C-D240-A505-F7AB7A9A1CEE}" dt="2024-10-21T20:59:48.579" v="357" actId="478"/>
+          <ac:spMkLst>
+            <pc:docMk/>
+            <pc:sldMk cId="417120182" sldId="265"/>
+            <ac:spMk id="6" creationId="{326E2F49-32E1-3C88-05B1-8DC2D93F5C0D}"/>
+          </ac:spMkLst>
+        </pc:spChg>
+        <pc:spChg chg="del">
+          <ac:chgData name="Baki, Harish" userId="7bd82cdd-4639-443b-92f4-81f263a001e1" providerId="ADAL" clId="{312E8114-CD7C-D240-A505-F7AB7A9A1CEE}" dt="2024-10-21T20:59:46.665" v="356" actId="478"/>
+          <ac:spMkLst>
+            <pc:docMk/>
+            <pc:sldMk cId="417120182" sldId="265"/>
+            <ac:spMk id="8" creationId="{E2F43689-F015-85AE-B7F0-3F238F709A54}"/>
+          </ac:spMkLst>
+        </pc:spChg>
+        <pc:spChg chg="del">
+          <ac:chgData name="Baki, Harish" userId="7bd82cdd-4639-443b-92f4-81f263a001e1" providerId="ADAL" clId="{312E8114-CD7C-D240-A505-F7AB7A9A1CEE}" dt="2024-10-21T20:59:44.170" v="354" actId="478"/>
+          <ac:spMkLst>
+            <pc:docMk/>
+            <pc:sldMk cId="417120182" sldId="265"/>
+            <ac:spMk id="12" creationId="{74151EE2-D627-E267-FCDF-0827F143552D}"/>
+          </ac:spMkLst>
+        </pc:spChg>
+        <pc:spChg chg="add mod">
+          <ac:chgData name="Baki, Harish" userId="7bd82cdd-4639-443b-92f4-81f263a001e1" providerId="ADAL" clId="{312E8114-CD7C-D240-A505-F7AB7A9A1CEE}" dt="2024-10-21T21:01:13.124" v="436" actId="5793"/>
+          <ac:spMkLst>
+            <pc:docMk/>
+            <pc:sldMk cId="417120182" sldId="265"/>
+            <ac:spMk id="13" creationId="{DDD71A82-2309-5866-4228-CD1D87EEB3E9}"/>
+          </ac:spMkLst>
+        </pc:spChg>
+        <pc:spChg chg="add mod">
+          <ac:chgData name="Baki, Harish" userId="7bd82cdd-4639-443b-92f4-81f263a001e1" providerId="ADAL" clId="{312E8114-CD7C-D240-A505-F7AB7A9A1CEE}" dt="2024-10-21T21:01:46.367" v="476" actId="20577"/>
+          <ac:spMkLst>
+            <pc:docMk/>
+            <pc:sldMk cId="417120182" sldId="265"/>
+            <ac:spMk id="14" creationId="{5A7A4488-B089-586C-F7C8-6F14665D1F7E}"/>
+          </ac:spMkLst>
+        </pc:spChg>
+        <pc:picChg chg="del">
+          <ac:chgData name="Baki, Harish" userId="7bd82cdd-4639-443b-92f4-81f263a001e1" providerId="ADAL" clId="{312E8114-CD7C-D240-A505-F7AB7A9A1CEE}" dt="2024-10-21T20:59:43.176" v="353" actId="478"/>
+          <ac:picMkLst>
+            <pc:docMk/>
+            <pc:sldMk cId="417120182" sldId="265"/>
+            <ac:picMk id="4" creationId="{0059B6EC-CD4D-F5D5-BFB4-B74BCCBBDF94}"/>
+          </ac:picMkLst>
+        </pc:picChg>
+        <pc:picChg chg="del">
+          <ac:chgData name="Baki, Harish" userId="7bd82cdd-4639-443b-92f4-81f263a001e1" providerId="ADAL" clId="{312E8114-CD7C-D240-A505-F7AB7A9A1CEE}" dt="2024-10-21T20:59:45.493" v="355" actId="478"/>
+          <ac:picMkLst>
+            <pc:docMk/>
+            <pc:sldMk cId="417120182" sldId="265"/>
+            <ac:picMk id="5" creationId="{AF62A969-07D3-F1FC-37A4-D43264F4EB17}"/>
+          </ac:picMkLst>
+        </pc:picChg>
+        <pc:picChg chg="add mod">
+          <ac:chgData name="Baki, Harish" userId="7bd82cdd-4639-443b-92f4-81f263a001e1" providerId="ADAL" clId="{312E8114-CD7C-D240-A505-F7AB7A9A1CEE}" dt="2024-10-21T21:00:41.670" v="364" actId="1076"/>
+          <ac:picMkLst>
+            <pc:docMk/>
+            <pc:sldMk cId="417120182" sldId="265"/>
+            <ac:picMk id="9" creationId="{722B0AED-DC14-33B5-9BC7-C1EB41D4CFE3}"/>
+          </ac:picMkLst>
+        </pc:picChg>
+        <pc:picChg chg="add mod">
+          <ac:chgData name="Baki, Harish" userId="7bd82cdd-4639-443b-92f4-81f263a001e1" providerId="ADAL" clId="{312E8114-CD7C-D240-A505-F7AB7A9A1CEE}" dt="2024-10-21T21:00:39.121" v="363" actId="1076"/>
+          <ac:picMkLst>
+            <pc:docMk/>
+            <pc:sldMk cId="417120182" sldId="265"/>
+            <ac:picMk id="11" creationId="{7450CAAD-6AB6-E58F-ECAB-0C09E25012AA}"/>
+          </ac:picMkLst>
+        </pc:picChg>
+      </pc:sldChg>
     </pc:docChg>
   </pc:docChgLst>
 </pc:chgInfo>
@@ -485,7 +725,7 @@
           <a:p>
             <a:fld id="{5697410A-290C-CF4F-9509-A3C2B7764448}" type="datetimeFigureOut">
               <a:rPr lang="en-US" smtClean="0"/>
-              <a:t>10/16/24</a:t>
+              <a:t>10/21/24</a:t>
             </a:fld>
             <a:endParaRPr lang="en-US"/>
           </a:p>
@@ -683,7 +923,7 @@
           <a:p>
             <a:fld id="{5697410A-290C-CF4F-9509-A3C2B7764448}" type="datetimeFigureOut">
               <a:rPr lang="en-US" smtClean="0"/>
-              <a:t>10/16/24</a:t>
+              <a:t>10/21/24</a:t>
             </a:fld>
             <a:endParaRPr lang="en-US"/>
           </a:p>
@@ -891,7 +1131,7 @@
           <a:p>
             <a:fld id="{5697410A-290C-CF4F-9509-A3C2B7764448}" type="datetimeFigureOut">
               <a:rPr lang="en-US" smtClean="0"/>
-              <a:t>10/16/24</a:t>
+              <a:t>10/21/24</a:t>
             </a:fld>
             <a:endParaRPr lang="en-US"/>
           </a:p>
@@ -1089,7 +1329,7 @@
           <a:p>
             <a:fld id="{5697410A-290C-CF4F-9509-A3C2B7764448}" type="datetimeFigureOut">
               <a:rPr lang="en-US" smtClean="0"/>
-              <a:t>10/16/24</a:t>
+              <a:t>10/21/24</a:t>
             </a:fld>
             <a:endParaRPr lang="en-US"/>
           </a:p>
@@ -1364,7 +1604,7 @@
           <a:p>
             <a:fld id="{5697410A-290C-CF4F-9509-A3C2B7764448}" type="datetimeFigureOut">
               <a:rPr lang="en-US" smtClean="0"/>
-              <a:t>10/16/24</a:t>
+              <a:t>10/21/24</a:t>
             </a:fld>
             <a:endParaRPr lang="en-US"/>
           </a:p>
@@ -1629,7 +1869,7 @@
           <a:p>
             <a:fld id="{5697410A-290C-CF4F-9509-A3C2B7764448}" type="datetimeFigureOut">
               <a:rPr lang="en-US" smtClean="0"/>
-              <a:t>10/16/24</a:t>
+              <a:t>10/21/24</a:t>
             </a:fld>
             <a:endParaRPr lang="en-US"/>
           </a:p>
@@ -2041,7 +2281,7 @@
           <a:p>
             <a:fld id="{5697410A-290C-CF4F-9509-A3C2B7764448}" type="datetimeFigureOut">
               <a:rPr lang="en-US" smtClean="0"/>
-              <a:t>10/16/24</a:t>
+              <a:t>10/21/24</a:t>
             </a:fld>
             <a:endParaRPr lang="en-US"/>
           </a:p>
@@ -2182,7 +2422,7 @@
           <a:p>
             <a:fld id="{5697410A-290C-CF4F-9509-A3C2B7764448}" type="datetimeFigureOut">
               <a:rPr lang="en-US" smtClean="0"/>
-              <a:t>10/16/24</a:t>
+              <a:t>10/21/24</a:t>
             </a:fld>
             <a:endParaRPr lang="en-US"/>
           </a:p>
@@ -2295,7 +2535,7 @@
           <a:p>
             <a:fld id="{5697410A-290C-CF4F-9509-A3C2B7764448}" type="datetimeFigureOut">
               <a:rPr lang="en-US" smtClean="0"/>
-              <a:t>10/16/24</a:t>
+              <a:t>10/21/24</a:t>
             </a:fld>
             <a:endParaRPr lang="en-US"/>
           </a:p>
@@ -2606,7 +2846,7 @@
           <a:p>
             <a:fld id="{5697410A-290C-CF4F-9509-A3C2B7764448}" type="datetimeFigureOut">
               <a:rPr lang="en-US" smtClean="0"/>
-              <a:t>10/16/24</a:t>
+              <a:t>10/21/24</a:t>
             </a:fld>
             <a:endParaRPr lang="en-US"/>
           </a:p>
@@ -2894,7 +3134,7 @@
           <a:p>
             <a:fld id="{5697410A-290C-CF4F-9509-A3C2B7764448}" type="datetimeFigureOut">
               <a:rPr lang="en-US" smtClean="0"/>
-              <a:t>10/16/24</a:t>
+              <a:t>10/21/24</a:t>
             </a:fld>
             <a:endParaRPr lang="en-US"/>
           </a:p>
@@ -3135,7 +3375,7 @@
           <a:p>
             <a:fld id="{5697410A-290C-CF4F-9509-A3C2B7764448}" type="datetimeFigureOut">
               <a:rPr lang="en-US" smtClean="0"/>
-              <a:t>10/16/24</a:t>
+              <a:t>10/21/24</a:t>
             </a:fld>
             <a:endParaRPr lang="en-US"/>
           </a:p>
@@ -3729,6 +3969,243 @@
 </p:sld>
 </file>
 
+<file path=ppt/slides/slide10.xml><?xml version="1.0" encoding="utf-8"?>
+<p:sld xmlns:a="http://schemas.openxmlformats.org/drawingml/2006/main" xmlns:r="http://schemas.openxmlformats.org/officeDocument/2006/relationships" xmlns:p="http://schemas.openxmlformats.org/presentationml/2006/main">
+  <p:cSld>
+    <p:spTree>
+      <p:nvGrpSpPr>
+        <p:cNvPr id="1" name="">
+          <a:extLst>
+            <a:ext uri="{FF2B5EF4-FFF2-40B4-BE49-F238E27FC236}">
+              <a16:creationId xmlns:a16="http://schemas.microsoft.com/office/drawing/2014/main" id="{E4B7FBD5-163A-CAC7-C462-C4D4227A1014}"/>
+            </a:ext>
+          </a:extLst>
+        </p:cNvPr>
+        <p:cNvGrpSpPr/>
+        <p:nvPr/>
+      </p:nvGrpSpPr>
+      <p:grpSpPr>
+        <a:xfrm>
+          <a:off x="0" y="0"/>
+          <a:ext cx="0" cy="0"/>
+          <a:chOff x="0" y="0"/>
+          <a:chExt cx="0" cy="0"/>
+        </a:xfrm>
+      </p:grpSpPr>
+      <p:sp>
+        <p:nvSpPr>
+          <p:cNvPr id="10" name="TextBox 9">
+            <a:extLst>
+              <a:ext uri="{FF2B5EF4-FFF2-40B4-BE49-F238E27FC236}">
+                <a16:creationId xmlns:a16="http://schemas.microsoft.com/office/drawing/2014/main" id="{9E0F04A7-B14D-A343-6A48-F5EE268485F0}"/>
+              </a:ext>
+            </a:extLst>
+          </p:cNvPr>
+          <p:cNvSpPr txBox="1"/>
+          <p:nvPr/>
+        </p:nvSpPr>
+        <p:spPr>
+          <a:xfrm>
+            <a:off x="248652" y="205680"/>
+            <a:ext cx="2406236" cy="584775"/>
+          </a:xfrm>
+          <a:prstGeom prst="rect">
+            <a:avLst/>
+          </a:prstGeom>
+          <a:noFill/>
+        </p:spPr>
+        <p:txBody>
+          <a:bodyPr wrap="none" rtlCol="0">
+            <a:spAutoFit/>
+          </a:bodyPr>
+          <a:lstStyle/>
+          <a:p>
+            <a:r>
+              <a:rPr lang="en-US" sz="3200" dirty="0"/>
+              <a:t>PROF_QUEE</a:t>
+            </a:r>
+          </a:p>
+        </p:txBody>
+      </p:sp>
+      <p:pic>
+        <p:nvPicPr>
+          <p:cNvPr id="9" name="Picture 8">
+            <a:extLst>
+              <a:ext uri="{FF2B5EF4-FFF2-40B4-BE49-F238E27FC236}">
+                <a16:creationId xmlns:a16="http://schemas.microsoft.com/office/drawing/2014/main" id="{722B0AED-DC14-33B5-9BC7-C1EB41D4CFE3}"/>
+              </a:ext>
+            </a:extLst>
+          </p:cNvPr>
+          <p:cNvPicPr>
+            <a:picLocks noChangeAspect="1"/>
+          </p:cNvPicPr>
+          <p:nvPr/>
+        </p:nvPicPr>
+        <p:blipFill>
+          <a:blip r:embed="rId2"/>
+          <a:stretch>
+            <a:fillRect/>
+          </a:stretch>
+        </p:blipFill>
+        <p:spPr>
+          <a:xfrm>
+            <a:off x="0" y="976524"/>
+            <a:ext cx="7119257" cy="2847703"/>
+          </a:xfrm>
+          <a:prstGeom prst="rect">
+            <a:avLst/>
+          </a:prstGeom>
+        </p:spPr>
+      </p:pic>
+      <p:pic>
+        <p:nvPicPr>
+          <p:cNvPr id="11" name="Picture 10">
+            <a:extLst>
+              <a:ext uri="{FF2B5EF4-FFF2-40B4-BE49-F238E27FC236}">
+                <a16:creationId xmlns:a16="http://schemas.microsoft.com/office/drawing/2014/main" id="{7450CAAD-6AB6-E58F-ECAB-0C09E25012AA}"/>
+              </a:ext>
+            </a:extLst>
+          </p:cNvPr>
+          <p:cNvPicPr>
+            <a:picLocks noChangeAspect="1"/>
+          </p:cNvPicPr>
+          <p:nvPr/>
+        </p:nvPicPr>
+        <p:blipFill>
+          <a:blip r:embed="rId3"/>
+          <a:stretch>
+            <a:fillRect/>
+          </a:stretch>
+        </p:blipFill>
+        <p:spPr>
+          <a:xfrm>
+            <a:off x="0" y="4010297"/>
+            <a:ext cx="7119257" cy="2847703"/>
+          </a:xfrm>
+          <a:prstGeom prst="rect">
+            <a:avLst/>
+          </a:prstGeom>
+        </p:spPr>
+      </p:pic>
+      <p:sp>
+        <p:nvSpPr>
+          <p:cNvPr id="13" name="TextBox 12">
+            <a:extLst>
+              <a:ext uri="{FF2B5EF4-FFF2-40B4-BE49-F238E27FC236}">
+                <a16:creationId xmlns:a16="http://schemas.microsoft.com/office/drawing/2014/main" id="{DDD71A82-2309-5866-4228-CD1D87EEB3E9}"/>
+              </a:ext>
+            </a:extLst>
+          </p:cNvPr>
+          <p:cNvSpPr txBox="1"/>
+          <p:nvPr/>
+        </p:nvSpPr>
+        <p:spPr>
+          <a:xfrm>
+            <a:off x="7413171" y="1774371"/>
+            <a:ext cx="3986669" cy="646331"/>
+          </a:xfrm>
+          <a:prstGeom prst="rect">
+            <a:avLst/>
+          </a:prstGeom>
+          <a:noFill/>
+        </p:spPr>
+        <p:txBody>
+          <a:bodyPr wrap="none" rtlCol="0">
+            <a:spAutoFit/>
+          </a:bodyPr>
+          <a:lstStyle/>
+          <a:p>
+            <a:r>
+              <a:rPr lang="en-US" dirty="0"/>
+              <a:t>1</a:t>
+            </a:r>
+            <a:r>
+              <a:rPr lang="en-US" baseline="30000" dirty="0"/>
+              <a:t>st</a:t>
+            </a:r>
+            <a:r>
+              <a:rPr lang="en-US" dirty="0"/>
+              <a:t> method for hourly data processing, </a:t>
+            </a:r>
+          </a:p>
+          <a:p>
+            <a:r>
+              <a:rPr lang="en-US" dirty="0"/>
+              <a:t>Unsegregated.</a:t>
+            </a:r>
+          </a:p>
+        </p:txBody>
+      </p:sp>
+      <p:sp>
+        <p:nvSpPr>
+          <p:cNvPr id="14" name="TextBox 13">
+            <a:extLst>
+              <a:ext uri="{FF2B5EF4-FFF2-40B4-BE49-F238E27FC236}">
+                <a16:creationId xmlns:a16="http://schemas.microsoft.com/office/drawing/2014/main" id="{5A7A4488-B089-586C-F7C8-6F14665D1F7E}"/>
+              </a:ext>
+            </a:extLst>
+          </p:cNvPr>
+          <p:cNvSpPr txBox="1"/>
+          <p:nvPr/>
+        </p:nvSpPr>
+        <p:spPr>
+          <a:xfrm>
+            <a:off x="7413171" y="4887686"/>
+            <a:ext cx="3986669" cy="646331"/>
+          </a:xfrm>
+          <a:prstGeom prst="rect">
+            <a:avLst/>
+          </a:prstGeom>
+          <a:noFill/>
+        </p:spPr>
+        <p:txBody>
+          <a:bodyPr wrap="none" rtlCol="0">
+            <a:spAutoFit/>
+          </a:bodyPr>
+          <a:lstStyle/>
+          <a:p>
+            <a:r>
+              <a:rPr lang="en-US" dirty="0"/>
+              <a:t>1</a:t>
+            </a:r>
+            <a:r>
+              <a:rPr lang="en-US" baseline="30000" dirty="0"/>
+              <a:t>st</a:t>
+            </a:r>
+            <a:r>
+              <a:rPr lang="en-US" dirty="0"/>
+              <a:t> method for hourly data processing, </a:t>
+            </a:r>
+          </a:p>
+          <a:p>
+            <a:r>
+              <a:rPr lang="en-US" dirty="0"/>
+              <a:t>Segregated using </a:t>
+            </a:r>
+            <a:r>
+              <a:rPr lang="en-US" dirty="0" err="1"/>
+              <a:t>IsolationForest</a:t>
+            </a:r>
+            <a:r>
+              <a:rPr lang="en-US" dirty="0"/>
+              <a:t>.</a:t>
+            </a:r>
+          </a:p>
+        </p:txBody>
+      </p:sp>
+    </p:spTree>
+    <p:extLst>
+      <p:ext uri="{BB962C8B-B14F-4D97-AF65-F5344CB8AC3E}">
+        <p14:creationId xmlns:p14="http://schemas.microsoft.com/office/powerpoint/2010/main" val="417120182"/>
+      </p:ext>
+    </p:extLst>
+  </p:cSld>
+  <p:clrMapOvr>
+    <a:masterClrMapping/>
+  </p:clrMapOvr>
+</p:sld>
+</file>
+
 <file path=ppt/slides/slide2.xml><?xml version="1.0" encoding="utf-8"?>
 <p:sld xmlns:a="http://schemas.openxmlformats.org/drawingml/2006/main" xmlns:r="http://schemas.openxmlformats.org/officeDocument/2006/relationships" xmlns:p="http://schemas.openxmlformats.org/presentationml/2006/main">
   <p:cSld>
@@ -4914,6 +5391,566 @@
     <p:extLst>
       <p:ext uri="{BB962C8B-B14F-4D97-AF65-F5344CB8AC3E}">
         <p14:creationId xmlns:p14="http://schemas.microsoft.com/office/powerpoint/2010/main" val="1006151111"/>
+      </p:ext>
+    </p:extLst>
+  </p:cSld>
+  <p:clrMapOvr>
+    <a:masterClrMapping/>
+  </p:clrMapOvr>
+</p:sld>
+</file>
+
+<file path=ppt/slides/slide8.xml><?xml version="1.0" encoding="utf-8"?>
+<p:sld xmlns:a="http://schemas.openxmlformats.org/drawingml/2006/main" xmlns:r="http://schemas.openxmlformats.org/officeDocument/2006/relationships" xmlns:p="http://schemas.openxmlformats.org/presentationml/2006/main">
+  <p:cSld>
+    <p:spTree>
+      <p:nvGrpSpPr>
+        <p:cNvPr id="1" name="">
+          <a:extLst>
+            <a:ext uri="{FF2B5EF4-FFF2-40B4-BE49-F238E27FC236}">
+              <a16:creationId xmlns:a16="http://schemas.microsoft.com/office/drawing/2014/main" id="{9D1162BF-ABD2-D51A-20EF-30C9AD8580CF}"/>
+            </a:ext>
+          </a:extLst>
+        </p:cNvPr>
+        <p:cNvGrpSpPr/>
+        <p:nvPr/>
+      </p:nvGrpSpPr>
+      <p:grpSpPr>
+        <a:xfrm>
+          <a:off x="0" y="0"/>
+          <a:ext cx="0" cy="0"/>
+          <a:chOff x="0" y="0"/>
+          <a:chExt cx="0" cy="0"/>
+        </a:xfrm>
+      </p:grpSpPr>
+      <p:sp>
+        <p:nvSpPr>
+          <p:cNvPr id="7" name="TextBox 6">
+            <a:extLst>
+              <a:ext uri="{FF2B5EF4-FFF2-40B4-BE49-F238E27FC236}">
+                <a16:creationId xmlns:a16="http://schemas.microsoft.com/office/drawing/2014/main" id="{277F5FD2-23F2-A39A-710B-5CE3866903DF}"/>
+              </a:ext>
+            </a:extLst>
+          </p:cNvPr>
+          <p:cNvSpPr txBox="1"/>
+          <p:nvPr/>
+        </p:nvSpPr>
+        <p:spPr>
+          <a:xfrm>
+            <a:off x="6353817" y="1016533"/>
+            <a:ext cx="1979901" cy="738664"/>
+          </a:xfrm>
+          <a:prstGeom prst="rect">
+            <a:avLst/>
+          </a:prstGeom>
+          <a:noFill/>
+        </p:spPr>
+        <p:txBody>
+          <a:bodyPr wrap="none" rtlCol="0">
+            <a:spAutoFit/>
+          </a:bodyPr>
+          <a:lstStyle/>
+          <a:p>
+            <a:r>
+              <a:rPr lang="en-US" sz="1400" dirty="0"/>
+              <a:t>1</a:t>
+            </a:r>
+            <a:r>
+              <a:rPr lang="en-US" sz="1400" baseline="30000" dirty="0"/>
+              <a:t>st</a:t>
+            </a:r>
+            <a:r>
+              <a:rPr lang="en-US" sz="1400" dirty="0"/>
+              <a:t> method: </a:t>
+            </a:r>
+          </a:p>
+          <a:p>
+            <a:r>
+              <a:rPr lang="en-US" sz="1400" dirty="0" err="1"/>
+              <a:t>nan.mean</a:t>
+            </a:r>
+            <a:r>
+              <a:rPr lang="en-US" sz="1400" dirty="0"/>
+              <a:t> </a:t>
+            </a:r>
+          </a:p>
+          <a:p>
+            <a:r>
+              <a:rPr lang="en-US" sz="1400" dirty="0"/>
+              <a:t>from 55</a:t>
+            </a:r>
+            <a:r>
+              <a:rPr lang="en-US" sz="1400" baseline="30000" dirty="0"/>
+              <a:t>th</a:t>
+            </a:r>
+            <a:r>
+              <a:rPr lang="en-US" sz="1400" dirty="0"/>
+              <a:t> min to 5</a:t>
+            </a:r>
+            <a:r>
+              <a:rPr lang="en-US" sz="1400" baseline="30000" dirty="0"/>
+              <a:t>th</a:t>
+            </a:r>
+            <a:r>
+              <a:rPr lang="en-US" sz="1400" dirty="0"/>
+              <a:t> min</a:t>
+            </a:r>
+          </a:p>
+        </p:txBody>
+      </p:sp>
+      <p:sp>
+        <p:nvSpPr>
+          <p:cNvPr id="9" name="TextBox 8">
+            <a:extLst>
+              <a:ext uri="{FF2B5EF4-FFF2-40B4-BE49-F238E27FC236}">
+                <a16:creationId xmlns:a16="http://schemas.microsoft.com/office/drawing/2014/main" id="{9575BCDE-B7F9-EADB-8EDD-459B64E95020}"/>
+              </a:ext>
+            </a:extLst>
+          </p:cNvPr>
+          <p:cNvSpPr txBox="1"/>
+          <p:nvPr/>
+        </p:nvSpPr>
+        <p:spPr>
+          <a:xfrm>
+            <a:off x="5203448" y="3853752"/>
+            <a:ext cx="2544351" cy="369332"/>
+          </a:xfrm>
+          <a:prstGeom prst="rect">
+            <a:avLst/>
+          </a:prstGeom>
+          <a:noFill/>
+        </p:spPr>
+        <p:txBody>
+          <a:bodyPr wrap="none" rtlCol="0">
+            <a:spAutoFit/>
+          </a:bodyPr>
+          <a:lstStyle/>
+          <a:p>
+            <a:r>
+              <a:rPr lang="en-US" dirty="0"/>
+              <a:t>Profiler MSE Loss, Ens 8</a:t>
+            </a:r>
+          </a:p>
+        </p:txBody>
+      </p:sp>
+      <p:sp>
+        <p:nvSpPr>
+          <p:cNvPr id="10" name="TextBox 9">
+            <a:extLst>
+              <a:ext uri="{FF2B5EF4-FFF2-40B4-BE49-F238E27FC236}">
+                <a16:creationId xmlns:a16="http://schemas.microsoft.com/office/drawing/2014/main" id="{58BC0461-5EE7-DC07-F455-354D8869754F}"/>
+              </a:ext>
+            </a:extLst>
+          </p:cNvPr>
+          <p:cNvSpPr txBox="1"/>
+          <p:nvPr/>
+        </p:nvSpPr>
+        <p:spPr>
+          <a:xfrm>
+            <a:off x="248652" y="205680"/>
+            <a:ext cx="2406236" cy="584775"/>
+          </a:xfrm>
+          <a:prstGeom prst="rect">
+            <a:avLst/>
+          </a:prstGeom>
+          <a:noFill/>
+        </p:spPr>
+        <p:txBody>
+          <a:bodyPr wrap="none" rtlCol="0">
+            <a:spAutoFit/>
+          </a:bodyPr>
+          <a:lstStyle/>
+          <a:p>
+            <a:r>
+              <a:rPr lang="en-US" sz="3200" dirty="0"/>
+              <a:t>PROF_QUEE</a:t>
+            </a:r>
+          </a:p>
+        </p:txBody>
+      </p:sp>
+      <p:pic>
+        <p:nvPicPr>
+          <p:cNvPr id="3" name="Picture 2" descr="A group of different colored squares&#10;&#10;Description automatically generated">
+            <a:extLst>
+              <a:ext uri="{FF2B5EF4-FFF2-40B4-BE49-F238E27FC236}">
+                <a16:creationId xmlns:a16="http://schemas.microsoft.com/office/drawing/2014/main" id="{61385268-7167-1864-A332-F30ECB5E262E}"/>
+              </a:ext>
+            </a:extLst>
+          </p:cNvPr>
+          <p:cNvPicPr>
+            <a:picLocks noChangeAspect="1"/>
+          </p:cNvPicPr>
+          <p:nvPr/>
+        </p:nvPicPr>
+        <p:blipFill>
+          <a:blip r:embed="rId2"/>
+          <a:srcRect l="10000" t="7733" r="8103" b="6164"/>
+          <a:stretch/>
+        </p:blipFill>
+        <p:spPr>
+          <a:xfrm>
+            <a:off x="181639" y="1765830"/>
+            <a:ext cx="8737998" cy="4175844"/>
+          </a:xfrm>
+          <a:prstGeom prst="rect">
+            <a:avLst/>
+          </a:prstGeom>
+        </p:spPr>
+      </p:pic>
+      <p:pic>
+        <p:nvPicPr>
+          <p:cNvPr id="13" name="Picture 12">
+            <a:extLst>
+              <a:ext uri="{FF2B5EF4-FFF2-40B4-BE49-F238E27FC236}">
+                <a16:creationId xmlns:a16="http://schemas.microsoft.com/office/drawing/2014/main" id="{EC437136-E614-B210-9CED-7D3AD0E33407}"/>
+              </a:ext>
+            </a:extLst>
+          </p:cNvPr>
+          <p:cNvPicPr>
+            <a:picLocks noChangeAspect="1"/>
+          </p:cNvPicPr>
+          <p:nvPr/>
+        </p:nvPicPr>
+        <p:blipFill>
+          <a:blip r:embed="rId3"/>
+          <a:srcRect l="64800" t="5812" r="6424" b="6292"/>
+          <a:stretch/>
+        </p:blipFill>
+        <p:spPr>
+          <a:xfrm>
+            <a:off x="8919637" y="1690240"/>
+            <a:ext cx="3062156" cy="4251434"/>
+          </a:xfrm>
+          <a:prstGeom prst="rect">
+            <a:avLst/>
+          </a:prstGeom>
+        </p:spPr>
+      </p:pic>
+      <p:sp>
+        <p:nvSpPr>
+          <p:cNvPr id="14" name="TextBox 13">
+            <a:extLst>
+              <a:ext uri="{FF2B5EF4-FFF2-40B4-BE49-F238E27FC236}">
+                <a16:creationId xmlns:a16="http://schemas.microsoft.com/office/drawing/2014/main" id="{881BBF53-B621-E286-FCC9-876FC40B6781}"/>
+              </a:ext>
+            </a:extLst>
+          </p:cNvPr>
+          <p:cNvSpPr txBox="1"/>
+          <p:nvPr/>
+        </p:nvSpPr>
+        <p:spPr>
+          <a:xfrm>
+            <a:off x="9370286" y="1016533"/>
+            <a:ext cx="2188741" cy="738664"/>
+          </a:xfrm>
+          <a:prstGeom prst="rect">
+            <a:avLst/>
+          </a:prstGeom>
+          <a:noFill/>
+        </p:spPr>
+        <p:txBody>
+          <a:bodyPr wrap="none" rtlCol="0">
+            <a:spAutoFit/>
+          </a:bodyPr>
+          <a:lstStyle/>
+          <a:p>
+            <a:r>
+              <a:rPr lang="en-US" sz="1400" dirty="0"/>
+              <a:t>2</a:t>
+            </a:r>
+            <a:r>
+              <a:rPr lang="en-US" sz="1400" baseline="30000" dirty="0"/>
+              <a:t>nd</a:t>
+            </a:r>
+            <a:r>
+              <a:rPr lang="en-US" sz="1400" dirty="0"/>
+              <a:t> method: </a:t>
+            </a:r>
+          </a:p>
+          <a:p>
+            <a:r>
+              <a:rPr lang="en-US" sz="1400" dirty="0"/>
+              <a:t>Time-shifting 5</a:t>
+            </a:r>
+            <a:r>
+              <a:rPr lang="en-US" sz="1400" baseline="30000" dirty="0"/>
+              <a:t>th</a:t>
+            </a:r>
+            <a:r>
+              <a:rPr lang="en-US" sz="1400" dirty="0"/>
+              <a:t> min data </a:t>
+            </a:r>
+          </a:p>
+          <a:p>
+            <a:r>
+              <a:rPr lang="en-US" sz="1400" dirty="0"/>
+              <a:t>to 00</a:t>
+            </a:r>
+            <a:r>
+              <a:rPr lang="en-US" sz="1400" baseline="30000" dirty="0"/>
+              <a:t>th</a:t>
+            </a:r>
+            <a:r>
+              <a:rPr lang="en-US" sz="1400" dirty="0"/>
+              <a:t> min</a:t>
+            </a:r>
+          </a:p>
+        </p:txBody>
+      </p:sp>
+    </p:spTree>
+    <p:extLst>
+      <p:ext uri="{BB962C8B-B14F-4D97-AF65-F5344CB8AC3E}">
+        <p14:creationId xmlns:p14="http://schemas.microsoft.com/office/powerpoint/2010/main" val="2134051098"/>
+      </p:ext>
+    </p:extLst>
+  </p:cSld>
+  <p:clrMapOvr>
+    <a:masterClrMapping/>
+  </p:clrMapOvr>
+</p:sld>
+</file>
+
+<file path=ppt/slides/slide9.xml><?xml version="1.0" encoding="utf-8"?>
+<p:sld xmlns:a="http://schemas.openxmlformats.org/drawingml/2006/main" xmlns:r="http://schemas.openxmlformats.org/officeDocument/2006/relationships" xmlns:p="http://schemas.openxmlformats.org/presentationml/2006/main">
+  <p:cSld>
+    <p:spTree>
+      <p:nvGrpSpPr>
+        <p:cNvPr id="1" name="">
+          <a:extLst>
+            <a:ext uri="{FF2B5EF4-FFF2-40B4-BE49-F238E27FC236}">
+              <a16:creationId xmlns:a16="http://schemas.microsoft.com/office/drawing/2014/main" id="{B7E40B07-113A-C853-3B69-9D0BF1EDDC33}"/>
+            </a:ext>
+          </a:extLst>
+        </p:cNvPr>
+        <p:cNvGrpSpPr/>
+        <p:nvPr/>
+      </p:nvGrpSpPr>
+      <p:grpSpPr>
+        <a:xfrm>
+          <a:off x="0" y="0"/>
+          <a:ext cx="0" cy="0"/>
+          <a:chOff x="0" y="0"/>
+          <a:chExt cx="0" cy="0"/>
+        </a:xfrm>
+      </p:grpSpPr>
+      <p:sp>
+        <p:nvSpPr>
+          <p:cNvPr id="10" name="TextBox 9">
+            <a:extLst>
+              <a:ext uri="{FF2B5EF4-FFF2-40B4-BE49-F238E27FC236}">
+                <a16:creationId xmlns:a16="http://schemas.microsoft.com/office/drawing/2014/main" id="{B30BAA9F-2409-1511-E6ED-66DBE3C3CAFC}"/>
+              </a:ext>
+            </a:extLst>
+          </p:cNvPr>
+          <p:cNvSpPr txBox="1"/>
+          <p:nvPr/>
+        </p:nvSpPr>
+        <p:spPr>
+          <a:xfrm>
+            <a:off x="248652" y="205680"/>
+            <a:ext cx="2406236" cy="584775"/>
+          </a:xfrm>
+          <a:prstGeom prst="rect">
+            <a:avLst/>
+          </a:prstGeom>
+          <a:noFill/>
+        </p:spPr>
+        <p:txBody>
+          <a:bodyPr wrap="none" rtlCol="0">
+            <a:spAutoFit/>
+          </a:bodyPr>
+          <a:lstStyle/>
+          <a:p>
+            <a:r>
+              <a:rPr lang="en-US" sz="3200" dirty="0"/>
+              <a:t>PROF_QUEE</a:t>
+            </a:r>
+          </a:p>
+        </p:txBody>
+      </p:sp>
+      <p:pic>
+        <p:nvPicPr>
+          <p:cNvPr id="4" name="Picture 3">
+            <a:extLst>
+              <a:ext uri="{FF2B5EF4-FFF2-40B4-BE49-F238E27FC236}">
+                <a16:creationId xmlns:a16="http://schemas.microsoft.com/office/drawing/2014/main" id="{DAE8BFC2-95E6-59D6-327C-D8691A7F7F46}"/>
+              </a:ext>
+            </a:extLst>
+          </p:cNvPr>
+          <p:cNvPicPr>
+            <a:picLocks noChangeAspect="1"/>
+          </p:cNvPicPr>
+          <p:nvPr/>
+        </p:nvPicPr>
+        <p:blipFill>
+          <a:blip r:embed="rId2"/>
+          <a:srcRect/>
+          <a:stretch/>
+        </p:blipFill>
+        <p:spPr>
+          <a:xfrm>
+            <a:off x="0" y="2286000"/>
+            <a:ext cx="6096000" cy="4572000"/>
+          </a:xfrm>
+          <a:prstGeom prst="rect">
+            <a:avLst/>
+          </a:prstGeom>
+        </p:spPr>
+      </p:pic>
+      <p:pic>
+        <p:nvPicPr>
+          <p:cNvPr id="5" name="Picture 4">
+            <a:extLst>
+              <a:ext uri="{FF2B5EF4-FFF2-40B4-BE49-F238E27FC236}">
+                <a16:creationId xmlns:a16="http://schemas.microsoft.com/office/drawing/2014/main" id="{3ED59EEF-F75A-CA94-A874-E2802F0BD102}"/>
+              </a:ext>
+            </a:extLst>
+          </p:cNvPr>
+          <p:cNvPicPr>
+            <a:picLocks noChangeAspect="1"/>
+          </p:cNvPicPr>
+          <p:nvPr/>
+        </p:nvPicPr>
+        <p:blipFill>
+          <a:blip r:embed="rId3"/>
+          <a:srcRect/>
+          <a:stretch/>
+        </p:blipFill>
+        <p:spPr>
+          <a:xfrm>
+            <a:off x="6096000" y="2286000"/>
+            <a:ext cx="6096000" cy="4572000"/>
+          </a:xfrm>
+          <a:prstGeom prst="rect">
+            <a:avLst/>
+          </a:prstGeom>
+        </p:spPr>
+      </p:pic>
+      <p:sp>
+        <p:nvSpPr>
+          <p:cNvPr id="6" name="TextBox 5">
+            <a:extLst>
+              <a:ext uri="{FF2B5EF4-FFF2-40B4-BE49-F238E27FC236}">
+                <a16:creationId xmlns:a16="http://schemas.microsoft.com/office/drawing/2014/main" id="{46038F00-4C0D-B6F2-45A7-782A3C99E0C3}"/>
+              </a:ext>
+            </a:extLst>
+          </p:cNvPr>
+          <p:cNvSpPr txBox="1"/>
+          <p:nvPr/>
+        </p:nvSpPr>
+        <p:spPr>
+          <a:xfrm>
+            <a:off x="772886" y="1905000"/>
+            <a:ext cx="1256178" cy="369332"/>
+          </a:xfrm>
+          <a:prstGeom prst="rect">
+            <a:avLst/>
+          </a:prstGeom>
+          <a:noFill/>
+        </p:spPr>
+        <p:txBody>
+          <a:bodyPr wrap="none" rtlCol="0">
+            <a:spAutoFit/>
+          </a:bodyPr>
+          <a:lstStyle/>
+          <a:p>
+            <a:r>
+              <a:rPr lang="en-US" dirty="0"/>
+              <a:t>1</a:t>
+            </a:r>
+            <a:r>
+              <a:rPr lang="en-US" baseline="30000" dirty="0"/>
+              <a:t>st</a:t>
+            </a:r>
+            <a:r>
+              <a:rPr lang="en-US" dirty="0"/>
+              <a:t> method</a:t>
+            </a:r>
+          </a:p>
+        </p:txBody>
+      </p:sp>
+      <p:sp>
+        <p:nvSpPr>
+          <p:cNvPr id="8" name="TextBox 7">
+            <a:extLst>
+              <a:ext uri="{FF2B5EF4-FFF2-40B4-BE49-F238E27FC236}">
+                <a16:creationId xmlns:a16="http://schemas.microsoft.com/office/drawing/2014/main" id="{98A14C1E-2A8B-3F76-54C8-264F3A351EB2}"/>
+              </a:ext>
+            </a:extLst>
+          </p:cNvPr>
+          <p:cNvSpPr txBox="1"/>
+          <p:nvPr/>
+        </p:nvSpPr>
+        <p:spPr>
+          <a:xfrm>
+            <a:off x="8991600" y="1785257"/>
+            <a:ext cx="1303562" cy="369332"/>
+          </a:xfrm>
+          <a:prstGeom prst="rect">
+            <a:avLst/>
+          </a:prstGeom>
+          <a:noFill/>
+        </p:spPr>
+        <p:txBody>
+          <a:bodyPr wrap="none" rtlCol="0">
+            <a:spAutoFit/>
+          </a:bodyPr>
+          <a:lstStyle/>
+          <a:p>
+            <a:r>
+              <a:rPr lang="en-US" dirty="0"/>
+              <a:t>2</a:t>
+            </a:r>
+            <a:r>
+              <a:rPr lang="en-US" baseline="30000" dirty="0"/>
+              <a:t>nd</a:t>
+            </a:r>
+            <a:r>
+              <a:rPr lang="en-US" dirty="0"/>
+              <a:t> method</a:t>
+            </a:r>
+          </a:p>
+        </p:txBody>
+      </p:sp>
+      <p:sp>
+        <p:nvSpPr>
+          <p:cNvPr id="15" name="TextBox 14">
+            <a:extLst>
+              <a:ext uri="{FF2B5EF4-FFF2-40B4-BE49-F238E27FC236}">
+                <a16:creationId xmlns:a16="http://schemas.microsoft.com/office/drawing/2014/main" id="{FDBE524F-359B-B843-C114-1383B6218903}"/>
+              </a:ext>
+            </a:extLst>
+          </p:cNvPr>
+          <p:cNvSpPr txBox="1"/>
+          <p:nvPr/>
+        </p:nvSpPr>
+        <p:spPr>
+          <a:xfrm>
+            <a:off x="4750904" y="1480930"/>
+            <a:ext cx="1713931" cy="369332"/>
+          </a:xfrm>
+          <a:prstGeom prst="rect">
+            <a:avLst/>
+          </a:prstGeom>
+          <a:noFill/>
+        </p:spPr>
+        <p:txBody>
+          <a:bodyPr wrap="none" rtlCol="0">
+            <a:spAutoFit/>
+          </a:bodyPr>
+          <a:lstStyle/>
+          <a:p>
+            <a:r>
+              <a:rPr lang="en-US"/>
+              <a:t>All non-missing</a:t>
+            </a:r>
+          </a:p>
+        </p:txBody>
+      </p:sp>
+    </p:spTree>
+    <p:extLst>
+      <p:ext uri="{BB962C8B-B14F-4D97-AF65-F5344CB8AC3E}">
+        <p14:creationId xmlns:p14="http://schemas.microsoft.com/office/powerpoint/2010/main" val="3623330729"/>
       </p:ext>
     </p:extLst>
   </p:cSld>

</xml_diff>